<commit_message>
Updated first presentation. Added new managers folder: Added first weeks tasks.
</commit_message>
<xml_diff>
--- a/Presentations/FirstPresentation.pptx
+++ b/Presentations/FirstPresentation.pptx
@@ -12,6 +12,7 @@
     <p:sldId id="262" r:id="rId6"/>
     <p:sldId id="260" r:id="rId7"/>
     <p:sldId id="261" r:id="rId8"/>
+    <p:sldId id="263" r:id="rId9"/>
   </p:sldIdLst>
   <p:sldSz cx="12192000" cy="6858000"/>
   <p:notesSz cx="6858000" cy="9144000"/>
@@ -6275,6 +6276,35 @@
           </a:extLst>
         </p:spPr>
       </p:pic>
+      <p:sp>
+        <p:nvSpPr>
+          <p:cNvPr id="5" name="TextBox 4"/>
+          <p:cNvSpPr txBox="1"/>
+          <p:nvPr/>
+        </p:nvSpPr>
+        <p:spPr>
+          <a:xfrm>
+            <a:off x="0" y="6492240"/>
+            <a:ext cx="685800" cy="369332"/>
+          </a:xfrm>
+          <a:prstGeom prst="rect">
+            <a:avLst/>
+          </a:prstGeom>
+          <a:noFill/>
+        </p:spPr>
+        <p:txBody>
+          <a:bodyPr wrap="square" rtlCol="0">
+            <a:spAutoFit/>
+          </a:bodyPr>
+          <a:lstStyle/>
+          <a:p>
+            <a:r>
+              <a:rPr lang="en-GB" dirty="0"/>
+              <a:t>IC</a:t>
+            </a:r>
+          </a:p>
+        </p:txBody>
+      </p:sp>
     </p:spTree>
     <p:extLst>
       <p:ext uri="{BB962C8B-B14F-4D97-AF65-F5344CB8AC3E}">
@@ -6452,7 +6482,7 @@
           <a:graphicData uri="http://schemas.openxmlformats.org/presentationml/2006/ole">
             <mc:AlternateContent xmlns:mc="http://schemas.openxmlformats.org/markup-compatibility/2006">
               <mc:Choice xmlns:v="urn:schemas-microsoft-com:vml" Requires="v">
-                <p:oleObj spid="_x0000_s2071" name="Image" r:id="rId3" imgW="5079240" imgH="2856960" progId="Photoshop.Image.13">
+                <p:oleObj spid="_x0000_s2082" name="Image" r:id="rId3" imgW="5079240" imgH="2856960" progId="Photoshop.Image.13">
                   <p:embed/>
                 </p:oleObj>
               </mc:Choice>
@@ -6825,6 +6855,47 @@
           </a:p>
         </p:txBody>
       </p:sp>
+      <p:pic>
+        <p:nvPicPr>
+          <p:cNvPr id="4098" name="Picture 2" descr="Image result for physics"/>
+          <p:cNvPicPr>
+            <a:picLocks noChangeAspect="1" noChangeArrowheads="1"/>
+          </p:cNvPicPr>
+          <p:nvPr/>
+        </p:nvPicPr>
+        <p:blipFill>
+          <a:blip r:embed="rId2">
+            <a:extLst>
+              <a:ext uri="{28A0092B-C50C-407E-A947-70E740481C1C}">
+                <a14:useLocalDpi xmlns:a14="http://schemas.microsoft.com/office/drawing/2010/main" val="0"/>
+              </a:ext>
+            </a:extLst>
+          </a:blip>
+          <a:srcRect/>
+          <a:stretch>
+            <a:fillRect/>
+          </a:stretch>
+        </p:blipFill>
+        <p:spPr bwMode="auto">
+          <a:xfrm>
+            <a:off x="5243210" y="1982574"/>
+            <a:ext cx="6326220" cy="3558499"/>
+          </a:xfrm>
+          <a:prstGeom prst="rect">
+            <a:avLst/>
+          </a:prstGeom>
+          <a:noFill/>
+          <a:extLst>
+            <a:ext uri="{909E8E84-426E-40DD-AFC4-6F175D3DCCD1}">
+              <a14:hiddenFill xmlns:a14="http://schemas.microsoft.com/office/drawing/2010/main">
+                <a:solidFill>
+                  <a:srgbClr val="FFFFFF"/>
+                </a:solidFill>
+              </a14:hiddenFill>
+            </a:ext>
+          </a:extLst>
+        </p:spPr>
+      </p:pic>
     </p:spTree>
     <p:extLst>
       <p:ext uri="{BB962C8B-B14F-4D97-AF65-F5344CB8AC3E}">
@@ -6904,6 +6975,9 @@
             <a:endParaRPr lang="en-GB" dirty="0"/>
           </a:p>
           <a:p>
+            <a:endParaRPr lang="en-GB" dirty="0"/>
+          </a:p>
+          <a:p>
             <a:r>
               <a:rPr lang="en-GB" dirty="0"/>
               <a:t>Mechanic can be used offensive or defensively</a:t>
@@ -6913,6 +6987,9 @@
             <a:endParaRPr lang="en-GB" dirty="0"/>
           </a:p>
           <a:p>
+            <a:endParaRPr lang="en-GB" dirty="0"/>
+          </a:p>
+          <a:p>
             <a:r>
               <a:rPr lang="en-GB" dirty="0"/>
               <a:t>Mixture of strategy and skill</a:t>
@@ -6923,6 +7000,76 @@
           </a:p>
           <a:p>
             <a:endParaRPr lang="en-GB" dirty="0"/>
+          </a:p>
+        </p:txBody>
+      </p:sp>
+      <p:pic>
+        <p:nvPicPr>
+          <p:cNvPr id="3074" name="Picture 2" descr="Image result for unique selling point"/>
+          <p:cNvPicPr>
+            <a:picLocks noChangeAspect="1" noChangeArrowheads="1"/>
+          </p:cNvPicPr>
+          <p:nvPr/>
+        </p:nvPicPr>
+        <p:blipFill>
+          <a:blip r:embed="rId2">
+            <a:extLst>
+              <a:ext uri="{28A0092B-C50C-407E-A947-70E740481C1C}">
+                <a14:useLocalDpi xmlns:a14="http://schemas.microsoft.com/office/drawing/2010/main" val="0"/>
+              </a:ext>
+            </a:extLst>
+          </a:blip>
+          <a:srcRect/>
+          <a:stretch>
+            <a:fillRect/>
+          </a:stretch>
+        </p:blipFill>
+        <p:spPr bwMode="auto">
+          <a:xfrm>
+            <a:off x="6848271" y="2432455"/>
+            <a:ext cx="4788845" cy="3192563"/>
+          </a:xfrm>
+          <a:prstGeom prst="rect">
+            <a:avLst/>
+          </a:prstGeom>
+          <a:noFill/>
+          <a:extLst>
+            <a:ext uri="{909E8E84-426E-40DD-AFC4-6F175D3DCCD1}">
+              <a14:hiddenFill xmlns:a14="http://schemas.microsoft.com/office/drawing/2010/main">
+                <a:solidFill>
+                  <a:srgbClr val="FFFFFF"/>
+                </a:solidFill>
+              </a14:hiddenFill>
+            </a:ext>
+          </a:extLst>
+        </p:spPr>
+      </p:pic>
+      <p:sp>
+        <p:nvSpPr>
+          <p:cNvPr id="5" name="TextBox 4"/>
+          <p:cNvSpPr txBox="1"/>
+          <p:nvPr/>
+        </p:nvSpPr>
+        <p:spPr>
+          <a:xfrm>
+            <a:off x="0" y="6492240"/>
+            <a:ext cx="685800" cy="369332"/>
+          </a:xfrm>
+          <a:prstGeom prst="rect">
+            <a:avLst/>
+          </a:prstGeom>
+          <a:noFill/>
+        </p:spPr>
+        <p:txBody>
+          <a:bodyPr wrap="square" rtlCol="0">
+            <a:spAutoFit/>
+          </a:bodyPr>
+          <a:lstStyle/>
+          <a:p>
+            <a:r>
+              <a:rPr lang="en-GB" dirty="0"/>
+              <a:t>IC</a:t>
+            </a:r>
           </a:p>
         </p:txBody>
       </p:sp>
@@ -7070,6 +7217,63 @@
     <p:extLst>
       <p:ext uri="{BB962C8B-B14F-4D97-AF65-F5344CB8AC3E}">
         <p14:creationId xmlns:p14="http://schemas.microsoft.com/office/powerpoint/2010/main" val="4294645890"/>
+      </p:ext>
+    </p:extLst>
+  </p:cSld>
+  <p:clrMapOvr>
+    <a:masterClrMapping/>
+  </p:clrMapOvr>
+</p:sld>
+</file>
+
+<file path=ppt/slides/slide8.xml><?xml version="1.0" encoding="utf-8"?>
+<p:sld xmlns:a="http://schemas.openxmlformats.org/drawingml/2006/main" xmlns:r="http://schemas.openxmlformats.org/officeDocument/2006/relationships" xmlns:p="http://schemas.openxmlformats.org/presentationml/2006/main">
+  <p:cSld>
+    <p:spTree>
+      <p:nvGrpSpPr>
+        <p:cNvPr id="1" name=""/>
+        <p:cNvGrpSpPr/>
+        <p:nvPr/>
+      </p:nvGrpSpPr>
+      <p:grpSpPr>
+        <a:xfrm>
+          <a:off x="0" y="0"/>
+          <a:ext cx="0" cy="0"/>
+          <a:chOff x="0" y="0"/>
+          <a:chExt cx="0" cy="0"/>
+        </a:xfrm>
+      </p:grpSpPr>
+      <p:sp>
+        <p:nvSpPr>
+          <p:cNvPr id="2" name="Title 1"/>
+          <p:cNvSpPr>
+            <a:spLocks noGrp="1"/>
+          </p:cNvSpPr>
+          <p:nvPr>
+            <p:ph type="title"/>
+          </p:nvPr>
+        </p:nvSpPr>
+        <p:spPr>
+          <a:xfrm>
+            <a:off x="913795" y="2749296"/>
+            <a:ext cx="10353762" cy="970450"/>
+          </a:xfrm>
+        </p:spPr>
+        <p:txBody>
+          <a:bodyPr/>
+          <a:lstStyle/>
+          <a:p>
+            <a:r>
+              <a:rPr lang="en-GB" dirty="0"/>
+              <a:t>Questions?</a:t>
+            </a:r>
+          </a:p>
+        </p:txBody>
+      </p:sp>
+    </p:spTree>
+    <p:extLst>
+      <p:ext uri="{BB962C8B-B14F-4D97-AF65-F5344CB8AC3E}">
+        <p14:creationId xmlns:p14="http://schemas.microsoft.com/office/powerpoint/2010/main" val="1034495763"/>
       </p:ext>
     </p:extLst>
   </p:cSld>

</xml_diff>